<commit_message>
sessions 2 & 3
</commit_message>
<xml_diff>
--- a/Meeting_1/Slides_Meeting_1.pptx
+++ b/Meeting_1/Slides_Meeting_1.pptx
@@ -275,7 +275,7 @@
           <a:p>
             <a:fld id="{61F7A4AC-B505-4320-A2BA-FB43C0225452}" type="datetimeFigureOut">
               <a:rPr lang="nl-BE" smtClean="0"/>
-              <a:t>2/11/2021</a:t>
+              <a:t>3/11/2021</a:t>
             </a:fld>
             <a:endParaRPr lang="nl-BE"/>
           </a:p>
@@ -475,7 +475,7 @@
           <a:p>
             <a:fld id="{61F7A4AC-B505-4320-A2BA-FB43C0225452}" type="datetimeFigureOut">
               <a:rPr lang="nl-BE" smtClean="0"/>
-              <a:t>2/11/2021</a:t>
+              <a:t>3/11/2021</a:t>
             </a:fld>
             <a:endParaRPr lang="nl-BE"/>
           </a:p>
@@ -685,7 +685,7 @@
           <a:p>
             <a:fld id="{61F7A4AC-B505-4320-A2BA-FB43C0225452}" type="datetimeFigureOut">
               <a:rPr lang="nl-BE" smtClean="0"/>
-              <a:t>2/11/2021</a:t>
+              <a:t>3/11/2021</a:t>
             </a:fld>
             <a:endParaRPr lang="nl-BE"/>
           </a:p>
@@ -885,7 +885,7 @@
           <a:p>
             <a:fld id="{61F7A4AC-B505-4320-A2BA-FB43C0225452}" type="datetimeFigureOut">
               <a:rPr lang="nl-BE" smtClean="0"/>
-              <a:t>2/11/2021</a:t>
+              <a:t>3/11/2021</a:t>
             </a:fld>
             <a:endParaRPr lang="nl-BE"/>
           </a:p>
@@ -1161,7 +1161,7 @@
           <a:p>
             <a:fld id="{61F7A4AC-B505-4320-A2BA-FB43C0225452}" type="datetimeFigureOut">
               <a:rPr lang="nl-BE" smtClean="0"/>
-              <a:t>2/11/2021</a:t>
+              <a:t>3/11/2021</a:t>
             </a:fld>
             <a:endParaRPr lang="nl-BE"/>
           </a:p>
@@ -1429,7 +1429,7 @@
           <a:p>
             <a:fld id="{61F7A4AC-B505-4320-A2BA-FB43C0225452}" type="datetimeFigureOut">
               <a:rPr lang="nl-BE" smtClean="0"/>
-              <a:t>2/11/2021</a:t>
+              <a:t>3/11/2021</a:t>
             </a:fld>
             <a:endParaRPr lang="nl-BE"/>
           </a:p>
@@ -1844,7 +1844,7 @@
           <a:p>
             <a:fld id="{61F7A4AC-B505-4320-A2BA-FB43C0225452}" type="datetimeFigureOut">
               <a:rPr lang="nl-BE" smtClean="0"/>
-              <a:t>2/11/2021</a:t>
+              <a:t>3/11/2021</a:t>
             </a:fld>
             <a:endParaRPr lang="nl-BE"/>
           </a:p>
@@ -1986,7 +1986,7 @@
           <a:p>
             <a:fld id="{61F7A4AC-B505-4320-A2BA-FB43C0225452}" type="datetimeFigureOut">
               <a:rPr lang="nl-BE" smtClean="0"/>
-              <a:t>2/11/2021</a:t>
+              <a:t>3/11/2021</a:t>
             </a:fld>
             <a:endParaRPr lang="nl-BE"/>
           </a:p>
@@ -2099,7 +2099,7 @@
           <a:p>
             <a:fld id="{61F7A4AC-B505-4320-A2BA-FB43C0225452}" type="datetimeFigureOut">
               <a:rPr lang="nl-BE" smtClean="0"/>
-              <a:t>2/11/2021</a:t>
+              <a:t>3/11/2021</a:t>
             </a:fld>
             <a:endParaRPr lang="nl-BE"/>
           </a:p>
@@ -2412,7 +2412,7 @@
           <a:p>
             <a:fld id="{61F7A4AC-B505-4320-A2BA-FB43C0225452}" type="datetimeFigureOut">
               <a:rPr lang="nl-BE" smtClean="0"/>
-              <a:t>2/11/2021</a:t>
+              <a:t>3/11/2021</a:t>
             </a:fld>
             <a:endParaRPr lang="nl-BE"/>
           </a:p>
@@ -2701,7 +2701,7 @@
           <a:p>
             <a:fld id="{61F7A4AC-B505-4320-A2BA-FB43C0225452}" type="datetimeFigureOut">
               <a:rPr lang="nl-BE" smtClean="0"/>
-              <a:t>2/11/2021</a:t>
+              <a:t>3/11/2021</a:t>
             </a:fld>
             <a:endParaRPr lang="nl-BE"/>
           </a:p>
@@ -2944,7 +2944,7 @@
           <a:p>
             <a:fld id="{61F7A4AC-B505-4320-A2BA-FB43C0225452}" type="datetimeFigureOut">
               <a:rPr lang="nl-BE" smtClean="0"/>
-              <a:t>2/11/2021</a:t>
+              <a:t>3/11/2021</a:t>
             </a:fld>
             <a:endParaRPr lang="nl-BE"/>
           </a:p>
@@ -4145,8 +4145,8 @@
           </p:sp>
         </mc:Fallback>
       </mc:AlternateContent>
-      <mc:AlternateContent xmlns:mc="http://schemas.openxmlformats.org/markup-compatibility/2006">
-        <mc:Choice xmlns:a14="http://schemas.microsoft.com/office/drawing/2010/main" Requires="a14">
+      <mc:AlternateContent xmlns:mc="http://schemas.openxmlformats.org/markup-compatibility/2006" xmlns:a14="http://schemas.microsoft.com/office/drawing/2010/main">
+        <mc:Choice Requires="a14">
           <p:sp>
             <p:nvSpPr>
               <p:cNvPr id="19" name="TextBox 18">
@@ -4315,7 +4315,7 @@
             </p:txBody>
           </p:sp>
         </mc:Choice>
-        <mc:Fallback>
+        <mc:Fallback xmlns="">
           <p:sp>
             <p:nvSpPr>
               <p:cNvPr id="19" name="TextBox 18">
@@ -4360,8 +4360,8 @@
           </p:sp>
         </mc:Fallback>
       </mc:AlternateContent>
-      <mc:AlternateContent xmlns:mc="http://schemas.openxmlformats.org/markup-compatibility/2006">
-        <mc:Choice xmlns:a14="http://schemas.microsoft.com/office/drawing/2010/main" Requires="a14">
+      <mc:AlternateContent xmlns:mc="http://schemas.openxmlformats.org/markup-compatibility/2006" xmlns:a14="http://schemas.microsoft.com/office/drawing/2010/main">
+        <mc:Choice Requires="a14">
           <p:sp>
             <p:nvSpPr>
               <p:cNvPr id="20" name="TextBox 19">
@@ -4754,7 +4754,7 @@
             </p:txBody>
           </p:sp>
         </mc:Choice>
-        <mc:Fallback>
+        <mc:Fallback xmlns="">
           <p:sp>
             <p:nvSpPr>
               <p:cNvPr id="20" name="TextBox 19">
@@ -4815,7 +4815,7 @@
             </p:nvSpPr>
             <p:spPr>
               <a:xfrm>
-                <a:off x="4783313" y="5322831"/>
+                <a:off x="4623382" y="5358351"/>
                 <a:ext cx="6978860" cy="618246"/>
               </a:xfrm>
               <a:prstGeom prst="rect">
@@ -5230,7 +5230,7 @@
             </p:nvSpPr>
             <p:spPr>
               <a:xfrm>
-                <a:off x="4783313" y="5322831"/>
+                <a:off x="4623382" y="5358351"/>
                 <a:ext cx="6978860" cy="618246"/>
               </a:xfrm>
               <a:prstGeom prst="rect">
@@ -5258,8 +5258,8 @@
           </p:sp>
         </mc:Fallback>
       </mc:AlternateContent>
-      <mc:AlternateContent xmlns:mc="http://schemas.openxmlformats.org/markup-compatibility/2006">
-        <mc:Choice xmlns:a14="http://schemas.microsoft.com/office/drawing/2010/main" Requires="a14">
+      <mc:AlternateContent xmlns:mc="http://schemas.openxmlformats.org/markup-compatibility/2006" xmlns:a14="http://schemas.microsoft.com/office/drawing/2010/main">
+        <mc:Choice Requires="a14">
           <p:sp>
             <p:nvSpPr>
               <p:cNvPr id="23" name="TextBox 22">
@@ -5529,7 +5529,7 @@
             </p:txBody>
           </p:sp>
         </mc:Choice>
-        <mc:Fallback>
+        <mc:Fallback xmlns="">
           <p:sp>
             <p:nvSpPr>
               <p:cNvPr id="23" name="TextBox 22">
@@ -5574,8 +5574,8 @@
           </p:sp>
         </mc:Fallback>
       </mc:AlternateContent>
-      <mc:AlternateContent xmlns:mc="http://schemas.openxmlformats.org/markup-compatibility/2006">
-        <mc:Choice xmlns:a14="http://schemas.microsoft.com/office/drawing/2010/main" Requires="a14">
+      <mc:AlternateContent xmlns:mc="http://schemas.openxmlformats.org/markup-compatibility/2006" xmlns:a14="http://schemas.microsoft.com/office/drawing/2010/main">
+        <mc:Choice Requires="a14">
           <p:sp>
             <p:nvSpPr>
               <p:cNvPr id="25" name="TextBox 24">
@@ -5784,7 +5784,7 @@
             </p:txBody>
           </p:sp>
         </mc:Choice>
-        <mc:Fallback>
+        <mc:Fallback xmlns="">
           <p:sp>
             <p:nvSpPr>
               <p:cNvPr id="25" name="TextBox 24">
@@ -6108,8 +6108,8 @@
           </a:p>
         </p:txBody>
       </p:sp>
-      <mc:AlternateContent xmlns:mc="http://schemas.openxmlformats.org/markup-compatibility/2006">
-        <mc:Choice xmlns:a14="http://schemas.microsoft.com/office/drawing/2010/main" Requires="a14">
+      <mc:AlternateContent xmlns:mc="http://schemas.openxmlformats.org/markup-compatibility/2006" xmlns:a14="http://schemas.microsoft.com/office/drawing/2010/main">
+        <mc:Choice Requires="a14">
           <p:sp>
             <p:nvSpPr>
               <p:cNvPr id="32" name="TextBox 31">
@@ -6241,7 +6241,7 @@
             </p:txBody>
           </p:sp>
         </mc:Choice>
-        <mc:Fallback>
+        <mc:Fallback xmlns="">
           <p:sp>
             <p:nvSpPr>
               <p:cNvPr id="32" name="TextBox 31">
@@ -7083,8 +7083,8 @@
           </p:sp>
         </mc:Fallback>
       </mc:AlternateContent>
-      <mc:AlternateContent xmlns:mc="http://schemas.openxmlformats.org/markup-compatibility/2006">
-        <mc:Choice xmlns:a14="http://schemas.microsoft.com/office/drawing/2010/main" Requires="a14">
+      <mc:AlternateContent xmlns:mc="http://schemas.openxmlformats.org/markup-compatibility/2006" xmlns:a14="http://schemas.microsoft.com/office/drawing/2010/main">
+        <mc:Choice Requires="a14">
           <p:sp>
             <p:nvSpPr>
               <p:cNvPr id="26" name="TextBox 25">
@@ -7461,7 +7461,7 @@
             </p:txBody>
           </p:sp>
         </mc:Choice>
-        <mc:Fallback>
+        <mc:Fallback xmlns="">
           <p:sp>
             <p:nvSpPr>
               <p:cNvPr id="26" name="TextBox 25">
@@ -8411,8 +8411,8 @@
           </p:sp>
         </mc:Fallback>
       </mc:AlternateContent>
-      <mc:AlternateContent xmlns:mc="http://schemas.openxmlformats.org/markup-compatibility/2006">
-        <mc:Choice xmlns:a14="http://schemas.microsoft.com/office/drawing/2010/main" Requires="a14">
+      <mc:AlternateContent xmlns:mc="http://schemas.openxmlformats.org/markup-compatibility/2006" xmlns:a14="http://schemas.microsoft.com/office/drawing/2010/main">
+        <mc:Choice Requires="a14">
           <p:sp>
             <p:nvSpPr>
               <p:cNvPr id="41" name="TextBox 40">
@@ -8544,7 +8544,7 @@
             </p:txBody>
           </p:sp>
         </mc:Choice>
-        <mc:Fallback>
+        <mc:Fallback xmlns="">
           <p:sp>
             <p:nvSpPr>
               <p:cNvPr id="41" name="TextBox 40">
@@ -8589,8 +8589,8 @@
           </p:sp>
         </mc:Fallback>
       </mc:AlternateContent>
-      <mc:AlternateContent xmlns:mc="http://schemas.openxmlformats.org/markup-compatibility/2006">
-        <mc:Choice xmlns:a14="http://schemas.microsoft.com/office/drawing/2010/main" Requires="a14">
+      <mc:AlternateContent xmlns:mc="http://schemas.openxmlformats.org/markup-compatibility/2006" xmlns:a14="http://schemas.microsoft.com/office/drawing/2010/main">
+        <mc:Choice Requires="a14">
           <p:sp>
             <p:nvSpPr>
               <p:cNvPr id="42" name="TextBox 41">
@@ -8619,7 +8619,6 @@
               </a:bodyPr>
               <a:lstStyle/>
               <a:p>
-                <a:pPr/>
                 <a14:m>
                   <m:oMath xmlns:m="http://schemas.openxmlformats.org/officeDocument/2006/math">
                     <m:acc>
@@ -8811,7 +8810,7 @@
             </p:txBody>
           </p:sp>
         </mc:Choice>
-        <mc:Fallback>
+        <mc:Fallback xmlns="">
           <p:sp>
             <p:nvSpPr>
               <p:cNvPr id="42" name="TextBox 41">
@@ -9100,8 +9099,8 @@
           </p:sp>
         </mc:Fallback>
       </mc:AlternateContent>
-      <mc:AlternateContent xmlns:mc="http://schemas.openxmlformats.org/markup-compatibility/2006">
-        <mc:Choice xmlns:a14="http://schemas.microsoft.com/office/drawing/2010/main" Requires="a14">
+      <mc:AlternateContent xmlns:mc="http://schemas.openxmlformats.org/markup-compatibility/2006" xmlns:a14="http://schemas.microsoft.com/office/drawing/2010/main">
+        <mc:Choice Requires="a14">
           <p:sp>
             <p:nvSpPr>
               <p:cNvPr id="19" name="TextBox 18">
@@ -9199,7 +9198,7 @@
             </p:txBody>
           </p:sp>
         </mc:Choice>
-        <mc:Fallback>
+        <mc:Fallback xmlns="">
           <p:sp>
             <p:nvSpPr>
               <p:cNvPr id="19" name="TextBox 18">
@@ -9968,6 +9967,411 @@
             <a:r>
               <a:rPr lang="nl-BE" b="1" dirty="0"/>
               <a:t> K,D?</a:t>
+            </a:r>
+          </a:p>
+        </p:txBody>
+      </p:sp>
+      <mc:AlternateContent xmlns:mc="http://schemas.openxmlformats.org/markup-compatibility/2006">
+        <mc:Choice xmlns:a14="http://schemas.microsoft.com/office/drawing/2010/main" Requires="a14">
+          <p:sp>
+            <p:nvSpPr>
+              <p:cNvPr id="4" name="TextBox 3">
+                <a:extLst>
+                  <a:ext uri="{FF2B5EF4-FFF2-40B4-BE49-F238E27FC236}">
+                    <a16:creationId xmlns:a16="http://schemas.microsoft.com/office/drawing/2014/main" id="{5F910ECB-B66F-43E2-BFB1-DD8FCABD79AC}"/>
+                  </a:ext>
+                </a:extLst>
+              </p:cNvPr>
+              <p:cNvSpPr txBox="1"/>
+              <p:nvPr/>
+            </p:nvSpPr>
+            <p:spPr>
+              <a:xfrm>
+                <a:off x="538480" y="5283863"/>
+                <a:ext cx="6395720" cy="377989"/>
+              </a:xfrm>
+              <a:prstGeom prst="rect">
+                <a:avLst/>
+              </a:prstGeom>
+              <a:noFill/>
+            </p:spPr>
+            <p:txBody>
+              <a:bodyPr wrap="square">
+                <a:spAutoFit/>
+              </a:bodyPr>
+              <a:lstStyle/>
+              <a:p>
+                <a:pPr/>
+                <a14:m>
+                  <m:oMathPara xmlns:m="http://schemas.openxmlformats.org/officeDocument/2006/math">
+                    <m:oMathParaPr>
+                      <m:jc m:val="centerGroup"/>
+                    </m:oMathParaPr>
+                    <m:oMath xmlns:m="http://schemas.openxmlformats.org/officeDocument/2006/math">
+                      <m:acc>
+                        <m:accPr>
+                          <m:chr m:val="̇"/>
+                          <m:ctrlPr>
+                            <a:rPr lang="nl-BE" i="1" smtClean="0">
+                              <a:latin typeface="Cambria Math" panose="02040503050406030204" pitchFamily="18" charset="0"/>
+                            </a:rPr>
+                          </m:ctrlPr>
+                        </m:accPr>
+                        <m:e>
+                          <m:r>
+                            <a:rPr lang="nl-BE" b="0" i="1" smtClean="0">
+                              <a:latin typeface="Cambria Math" panose="02040503050406030204" pitchFamily="18" charset="0"/>
+                            </a:rPr>
+                            <m:t>𝑃</m:t>
+                          </m:r>
+                        </m:e>
+                      </m:acc>
+                      <m:r>
+                        <m:rPr>
+                          <m:nor/>
+                        </m:rPr>
+                        <a:rPr lang="nl-BE" b="0" i="0" smtClean="0">
+                          <a:latin typeface="Cambria Math" panose="02040503050406030204" pitchFamily="18" charset="0"/>
+                        </a:rPr>
+                        <m:t>=</m:t>
+                      </m:r>
+                      <m:r>
+                        <m:rPr>
+                          <m:nor/>
+                        </m:rPr>
+                        <a:rPr lang="nl-BE" b="0" i="0" smtClean="0">
+                          <a:solidFill>
+                            <a:srgbClr val="C00000"/>
+                          </a:solidFill>
+                          <a:latin typeface="Cambria Math" panose="02040503050406030204" pitchFamily="18" charset="0"/>
+                        </a:rPr>
+                        <m:t>A</m:t>
+                      </m:r>
+                      <m:r>
+                        <a:rPr lang="nl-BE" b="0" i="1" smtClean="0">
+                          <a:solidFill>
+                            <a:srgbClr val="C00000"/>
+                          </a:solidFill>
+                          <a:latin typeface="Cambria Math" panose="02040503050406030204" pitchFamily="18" charset="0"/>
+                          <a:ea typeface="Cambria Math" panose="02040503050406030204" pitchFamily="18" charset="0"/>
+                        </a:rPr>
+                        <m:t>∙</m:t>
+                      </m:r>
+                      <m:r>
+                        <a:rPr lang="nl-BE" b="0" i="1" smtClean="0">
+                          <a:solidFill>
+                            <a:srgbClr val="C00000"/>
+                          </a:solidFill>
+                          <a:latin typeface="Cambria Math" panose="02040503050406030204" pitchFamily="18" charset="0"/>
+                          <a:ea typeface="Cambria Math" panose="02040503050406030204" pitchFamily="18" charset="0"/>
+                        </a:rPr>
+                        <m:t>𝑃</m:t>
+                      </m:r>
+                      <m:r>
+                        <a:rPr lang="nl-BE" b="0" i="1" smtClean="0">
+                          <a:solidFill>
+                            <a:srgbClr val="C00000"/>
+                          </a:solidFill>
+                          <a:latin typeface="Cambria Math" panose="02040503050406030204" pitchFamily="18" charset="0"/>
+                          <a:ea typeface="Cambria Math" panose="02040503050406030204" pitchFamily="18" charset="0"/>
+                        </a:rPr>
+                        <m:t>+</m:t>
+                      </m:r>
+                      <m:r>
+                        <a:rPr lang="nl-BE" b="0" i="1" smtClean="0">
+                          <a:solidFill>
+                            <a:srgbClr val="C00000"/>
+                          </a:solidFill>
+                          <a:latin typeface="Cambria Math" panose="02040503050406030204" pitchFamily="18" charset="0"/>
+                          <a:ea typeface="Cambria Math" panose="02040503050406030204" pitchFamily="18" charset="0"/>
+                        </a:rPr>
+                        <m:t>𝑃</m:t>
+                      </m:r>
+                      <m:r>
+                        <a:rPr lang="nl-BE" b="0" i="1" smtClean="0">
+                          <a:solidFill>
+                            <a:srgbClr val="C00000"/>
+                          </a:solidFill>
+                          <a:latin typeface="Cambria Math" panose="02040503050406030204" pitchFamily="18" charset="0"/>
+                          <a:ea typeface="Cambria Math" panose="02040503050406030204" pitchFamily="18" charset="0"/>
+                        </a:rPr>
+                        <m:t>∙</m:t>
+                      </m:r>
+                      <m:sSup>
+                        <m:sSupPr>
+                          <m:ctrlPr>
+                            <a:rPr lang="nl-BE" b="0" i="1" smtClean="0">
+                              <a:solidFill>
+                                <a:srgbClr val="C00000"/>
+                              </a:solidFill>
+                              <a:latin typeface="Cambria Math" panose="02040503050406030204" pitchFamily="18" charset="0"/>
+                              <a:ea typeface="Cambria Math" panose="02040503050406030204" pitchFamily="18" charset="0"/>
+                            </a:rPr>
+                          </m:ctrlPr>
+                        </m:sSupPr>
+                        <m:e>
+                          <m:r>
+                            <m:rPr>
+                              <m:sty m:val="p"/>
+                            </m:rPr>
+                            <a:rPr lang="nl-BE" b="0" i="0" smtClean="0">
+                              <a:solidFill>
+                                <a:srgbClr val="C00000"/>
+                              </a:solidFill>
+                              <a:latin typeface="Cambria Math" panose="02040503050406030204" pitchFamily="18" charset="0"/>
+                              <a:ea typeface="Cambria Math" panose="02040503050406030204" pitchFamily="18" charset="0"/>
+                            </a:rPr>
+                            <m:t>A</m:t>
+                          </m:r>
+                        </m:e>
+                        <m:sup>
+                          <m:r>
+                            <a:rPr lang="nl-BE" b="0" i="0" smtClean="0">
+                              <a:solidFill>
+                                <a:srgbClr val="C00000"/>
+                              </a:solidFill>
+                              <a:latin typeface="Cambria Math" panose="02040503050406030204" pitchFamily="18" charset="0"/>
+                              <a:ea typeface="Cambria Math" panose="02040503050406030204" pitchFamily="18" charset="0"/>
+                            </a:rPr>
+                            <m:t>′</m:t>
+                          </m:r>
+                        </m:sup>
+                      </m:sSup>
+                      <m:r>
+                        <a:rPr lang="nl-BE" b="0" i="0" smtClean="0">
+                          <a:latin typeface="Cambria Math" panose="02040503050406030204" pitchFamily="18" charset="0"/>
+                          <a:ea typeface="Cambria Math" panose="02040503050406030204" pitchFamily="18" charset="0"/>
+                        </a:rPr>
+                        <m:t>+</m:t>
+                      </m:r>
+                      <m:r>
+                        <m:rPr>
+                          <m:sty m:val="p"/>
+                        </m:rPr>
+                        <a:rPr lang="nl-BE" b="0" i="0" smtClean="0">
+                          <a:solidFill>
+                            <a:schemeClr val="accent6">
+                              <a:lumMod val="75000"/>
+                            </a:schemeClr>
+                          </a:solidFill>
+                          <a:latin typeface="Cambria Math" panose="02040503050406030204" pitchFamily="18" charset="0"/>
+                          <a:ea typeface="Cambria Math" panose="02040503050406030204" pitchFamily="18" charset="0"/>
+                        </a:rPr>
+                        <m:t>C</m:t>
+                      </m:r>
+                      <m:sSub>
+                        <m:sSubPr>
+                          <m:ctrlPr>
+                            <a:rPr lang="nl-BE" b="0" i="1" smtClean="0">
+                              <a:solidFill>
+                                <a:schemeClr val="accent6">
+                                  <a:lumMod val="75000"/>
+                                </a:schemeClr>
+                              </a:solidFill>
+                              <a:latin typeface="Cambria Math" panose="02040503050406030204" pitchFamily="18" charset="0"/>
+                              <a:ea typeface="Cambria Math" panose="02040503050406030204" pitchFamily="18" charset="0"/>
+                            </a:rPr>
+                          </m:ctrlPr>
+                        </m:sSubPr>
+                        <m:e>
+                          <m:r>
+                            <m:rPr>
+                              <m:sty m:val="p"/>
+                            </m:rPr>
+                            <a:rPr lang="el-GR" b="0" i="1" smtClean="0">
+                              <a:solidFill>
+                                <a:schemeClr val="accent6">
+                                  <a:lumMod val="75000"/>
+                                </a:schemeClr>
+                              </a:solidFill>
+                              <a:latin typeface="Cambria Math" panose="02040503050406030204" pitchFamily="18" charset="0"/>
+                              <a:ea typeface="Cambria Math" panose="02040503050406030204" pitchFamily="18" charset="0"/>
+                            </a:rPr>
+                            <m:t>Σ</m:t>
+                          </m:r>
+                        </m:e>
+                        <m:sub>
+                          <m:r>
+                            <a:rPr lang="nl-BE" b="0" i="1" smtClean="0">
+                              <a:solidFill>
+                                <a:schemeClr val="accent6">
+                                  <a:lumMod val="75000"/>
+                                </a:schemeClr>
+                              </a:solidFill>
+                              <a:latin typeface="Cambria Math" panose="02040503050406030204" pitchFamily="18" charset="0"/>
+                              <a:ea typeface="Cambria Math" panose="02040503050406030204" pitchFamily="18" charset="0"/>
+                            </a:rPr>
+                            <m:t>𝑤</m:t>
+                          </m:r>
+                        </m:sub>
+                      </m:sSub>
+                      <m:r>
+                        <m:rPr>
+                          <m:sty m:val="p"/>
+                        </m:rPr>
+                        <a:rPr lang="nl-BE" b="0" i="0" smtClean="0">
+                          <a:solidFill>
+                            <a:schemeClr val="accent6">
+                              <a:lumMod val="75000"/>
+                            </a:schemeClr>
+                          </a:solidFill>
+                          <a:latin typeface="Cambria Math" panose="02040503050406030204" pitchFamily="18" charset="0"/>
+                          <a:ea typeface="Cambria Math" panose="02040503050406030204" pitchFamily="18" charset="0"/>
+                        </a:rPr>
+                        <m:t>C</m:t>
+                      </m:r>
+                      <m:r>
+                        <a:rPr lang="nl-BE" b="0" i="0" smtClean="0">
+                          <a:solidFill>
+                            <a:schemeClr val="accent6">
+                              <a:lumMod val="75000"/>
+                            </a:schemeClr>
+                          </a:solidFill>
+                          <a:latin typeface="Cambria Math" panose="02040503050406030204" pitchFamily="18" charset="0"/>
+                          <a:ea typeface="Cambria Math" panose="02040503050406030204" pitchFamily="18" charset="0"/>
+                        </a:rPr>
+                        <m:t>′</m:t>
+                      </m:r>
+                    </m:oMath>
+                  </m:oMathPara>
+                </a14:m>
+                <a:endParaRPr lang="nl-BE" dirty="0"/>
+              </a:p>
+            </p:txBody>
+          </p:sp>
+        </mc:Choice>
+        <mc:Fallback>
+          <p:sp>
+            <p:nvSpPr>
+              <p:cNvPr id="4" name="TextBox 3">
+                <a:extLst>
+                  <a:ext uri="{FF2B5EF4-FFF2-40B4-BE49-F238E27FC236}">
+                    <a16:creationId xmlns:a16="http://schemas.microsoft.com/office/drawing/2014/main" id="{5F910ECB-B66F-43E2-BFB1-DD8FCABD79AC}"/>
+                  </a:ext>
+                </a:extLst>
+              </p:cNvPr>
+              <p:cNvSpPr txBox="1">
+                <a:spLocks noRot="1" noChangeAspect="1" noMove="1" noResize="1" noEditPoints="1" noAdjustHandles="1" noChangeArrowheads="1" noChangeShapeType="1" noTextEdit="1"/>
+              </p:cNvSpPr>
+              <p:nvPr/>
+            </p:nvSpPr>
+            <p:spPr>
+              <a:xfrm>
+                <a:off x="538480" y="5283863"/>
+                <a:ext cx="6395720" cy="377989"/>
+              </a:xfrm>
+              <a:prstGeom prst="rect">
+                <a:avLst/>
+              </a:prstGeom>
+              <a:blipFill>
+                <a:blip r:embed="rId2"/>
+                <a:stretch>
+                  <a:fillRect/>
+                </a:stretch>
+              </a:blipFill>
+            </p:spPr>
+            <p:txBody>
+              <a:bodyPr/>
+              <a:lstStyle/>
+              <a:p>
+                <a:r>
+                  <a:rPr lang="nl-BE">
+                    <a:noFill/>
+                  </a:rPr>
+                  <a:t> </a:t>
+                </a:r>
+              </a:p>
+            </p:txBody>
+          </p:sp>
+        </mc:Fallback>
+      </mc:AlternateContent>
+      <p:sp>
+        <p:nvSpPr>
+          <p:cNvPr id="6" name="TextBox 5">
+            <a:extLst>
+              <a:ext uri="{FF2B5EF4-FFF2-40B4-BE49-F238E27FC236}">
+                <a16:creationId xmlns:a16="http://schemas.microsoft.com/office/drawing/2014/main" id="{4E796E14-7599-44B6-8235-3DF3D55FCED8}"/>
+              </a:ext>
+            </a:extLst>
+          </p:cNvPr>
+          <p:cNvSpPr txBox="1"/>
+          <p:nvPr/>
+        </p:nvSpPr>
+        <p:spPr>
+          <a:xfrm>
+            <a:off x="2532355" y="4444150"/>
+            <a:ext cx="6094520" cy="646331"/>
+          </a:xfrm>
+          <a:prstGeom prst="rect">
+            <a:avLst/>
+          </a:prstGeom>
+          <a:noFill/>
+        </p:spPr>
+        <p:txBody>
+          <a:bodyPr wrap="square">
+            <a:spAutoFit/>
+          </a:bodyPr>
+          <a:lstStyle/>
+          <a:p>
+            <a:r>
+              <a:rPr lang="nl-BE" sz="1800" b="0" i="0" u="none" strike="noStrike" baseline="0" dirty="0">
+                <a:solidFill>
+                  <a:srgbClr val="000000"/>
+                </a:solidFill>
+                <a:latin typeface="Courier New" panose="02070309020205020404" pitchFamily="49" charset="0"/>
+              </a:rPr>
+              <a:t>A = [0 1; </a:t>
+            </a:r>
+          </a:p>
+          <a:p>
+            <a:r>
+              <a:rPr lang="nl-BE" sz="1800" b="0" i="0" u="none" strike="noStrike" baseline="0" dirty="0">
+                <a:solidFill>
+                  <a:srgbClr val="000000"/>
+                </a:solidFill>
+                <a:latin typeface="Courier New" panose="02070309020205020404" pitchFamily="49" charset="0"/>
+              </a:rPr>
+              <a:t>     K/m D/m];</a:t>
+            </a:r>
+          </a:p>
+        </p:txBody>
+      </p:sp>
+      <p:sp>
+        <p:nvSpPr>
+          <p:cNvPr id="8" name="TextBox 7">
+            <a:extLst>
+              <a:ext uri="{FF2B5EF4-FFF2-40B4-BE49-F238E27FC236}">
+                <a16:creationId xmlns:a16="http://schemas.microsoft.com/office/drawing/2014/main" id="{493B26EF-7B4E-4942-B744-2D7A6C8C8118}"/>
+              </a:ext>
+            </a:extLst>
+          </p:cNvPr>
+          <p:cNvSpPr txBox="1"/>
+          <p:nvPr/>
+        </p:nvSpPr>
+        <p:spPr>
+          <a:xfrm>
+            <a:off x="5293310" y="4582649"/>
+            <a:ext cx="6094520" cy="369332"/>
+          </a:xfrm>
+          <a:prstGeom prst="rect">
+            <a:avLst/>
+          </a:prstGeom>
+          <a:noFill/>
+        </p:spPr>
+        <p:txBody>
+          <a:bodyPr wrap="square">
+            <a:spAutoFit/>
+          </a:bodyPr>
+          <a:lstStyle/>
+          <a:p>
+            <a:r>
+              <a:rPr lang="nl-BE" sz="1800" b="0" i="0" u="none" strike="noStrike" baseline="0" dirty="0">
+                <a:solidFill>
+                  <a:srgbClr val="000000"/>
+                </a:solidFill>
+                <a:latin typeface="Courier New" panose="02070309020205020404" pitchFamily="49" charset="0"/>
+              </a:rPr>
+              <a:t>C = [0; 1/m];</a:t>
             </a:r>
           </a:p>
         </p:txBody>
@@ -10715,8 +11119,8 @@
           </p:sp>
         </mc:Fallback>
       </mc:AlternateContent>
-      <mc:AlternateContent xmlns:mc="http://schemas.openxmlformats.org/markup-compatibility/2006">
-        <mc:Choice xmlns:a14="http://schemas.microsoft.com/office/drawing/2010/main" Requires="a14">
+      <mc:AlternateContent xmlns:mc="http://schemas.openxmlformats.org/markup-compatibility/2006" xmlns:a14="http://schemas.microsoft.com/office/drawing/2010/main">
+        <mc:Choice Requires="a14">
           <p:sp>
             <p:nvSpPr>
               <p:cNvPr id="19" name="TextBox 18">
@@ -10808,7 +11212,7 @@
             </p:txBody>
           </p:sp>
         </mc:Choice>
-        <mc:Fallback>
+        <mc:Fallback xmlns="">
           <p:sp>
             <p:nvSpPr>
               <p:cNvPr id="19" name="TextBox 18">
@@ -12853,8 +13257,8 @@
           </p:sp>
         </mc:Fallback>
       </mc:AlternateContent>
-      <mc:AlternateContent xmlns:mc="http://schemas.openxmlformats.org/markup-compatibility/2006">
-        <mc:Choice xmlns:a14="http://schemas.microsoft.com/office/drawing/2010/main" Requires="a14">
+      <mc:AlternateContent xmlns:mc="http://schemas.openxmlformats.org/markup-compatibility/2006" xmlns:a14="http://schemas.microsoft.com/office/drawing/2010/main">
+        <mc:Choice Requires="a14">
           <p:sp>
             <p:nvSpPr>
               <p:cNvPr id="35" name="TextBox 34">
@@ -12946,7 +13350,7 @@
             </p:txBody>
           </p:sp>
         </mc:Choice>
-        <mc:Fallback>
+        <mc:Fallback xmlns="">
           <p:sp>
             <p:nvSpPr>
               <p:cNvPr id="35" name="TextBox 34">
@@ -14906,8 +15310,8 @@
           </a:p>
         </p:txBody>
       </p:sp>
-      <mc:AlternateContent xmlns:mc="http://schemas.openxmlformats.org/markup-compatibility/2006">
-        <mc:Choice xmlns:a14="http://schemas.microsoft.com/office/drawing/2010/main" Requires="a14">
+      <mc:AlternateContent xmlns:mc="http://schemas.openxmlformats.org/markup-compatibility/2006" xmlns:a14="http://schemas.microsoft.com/office/drawing/2010/main">
+        <mc:Choice Requires="a14">
           <p:sp>
             <p:nvSpPr>
               <p:cNvPr id="8" name="TextBox 7">
@@ -14977,7 +15381,7 @@
             </p:txBody>
           </p:sp>
         </mc:Choice>
-        <mc:Fallback>
+        <mc:Fallback xmlns="">
           <p:sp>
             <p:nvSpPr>
               <p:cNvPr id="8" name="TextBox 7">
@@ -15022,8 +15426,8 @@
           </p:sp>
         </mc:Fallback>
       </mc:AlternateContent>
-      <mc:AlternateContent xmlns:mc="http://schemas.openxmlformats.org/markup-compatibility/2006">
-        <mc:Choice xmlns:a14="http://schemas.microsoft.com/office/drawing/2010/main" Requires="a14">
+      <mc:AlternateContent xmlns:mc="http://schemas.openxmlformats.org/markup-compatibility/2006" xmlns:a14="http://schemas.microsoft.com/office/drawing/2010/main">
+        <mc:Choice Requires="a14">
           <p:sp>
             <p:nvSpPr>
               <p:cNvPr id="54" name="TextBox 53">
@@ -15093,7 +15497,7 @@
             </p:txBody>
           </p:sp>
         </mc:Choice>
-        <mc:Fallback>
+        <mc:Fallback xmlns="">
           <p:sp>
             <p:nvSpPr>
               <p:cNvPr id="54" name="TextBox 53">
@@ -15227,8 +15631,8 @@
           </a:p>
         </p:txBody>
       </p:sp>
-      <mc:AlternateContent xmlns:mc="http://schemas.openxmlformats.org/markup-compatibility/2006">
-        <mc:Choice xmlns:a14="http://schemas.microsoft.com/office/drawing/2010/main" Requires="a14">
+      <mc:AlternateContent xmlns:mc="http://schemas.openxmlformats.org/markup-compatibility/2006" xmlns:a14="http://schemas.microsoft.com/office/drawing/2010/main">
+        <mc:Choice Requires="a14">
           <p:sp>
             <p:nvSpPr>
               <p:cNvPr id="4" name="Content Placeholder 3">
@@ -15261,7 +15665,6 @@
               </a:bodyPr>
               <a:lstStyle/>
               <a:p>
-                <a:pPr/>
                 <a14:m>
                   <m:oMath xmlns:m="http://schemas.openxmlformats.org/officeDocument/2006/math">
                     <m:acc>
@@ -16372,7 +16775,7 @@
             </p:txBody>
           </p:sp>
         </mc:Choice>
-        <mc:Fallback>
+        <mc:Fallback xmlns="">
           <p:sp>
             <p:nvSpPr>
               <p:cNvPr id="4" name="Content Placeholder 3">
@@ -16494,8 +16897,8 @@
           <a:chExt cx="0" cy="0"/>
         </a:xfrm>
       </p:grpSpPr>
-      <mc:AlternateContent xmlns:mc="http://schemas.openxmlformats.org/markup-compatibility/2006">
-        <mc:Choice xmlns:a14="http://schemas.microsoft.com/office/drawing/2010/main" Requires="a14">
+      <mc:AlternateContent xmlns:mc="http://schemas.openxmlformats.org/markup-compatibility/2006" xmlns:a14="http://schemas.microsoft.com/office/drawing/2010/main">
+        <mc:Choice Requires="a14">
           <p:sp>
             <p:nvSpPr>
               <p:cNvPr id="3" name="Content Placeholder 2">
@@ -17179,7 +17582,7 @@
             </p:txBody>
           </p:sp>
         </mc:Choice>
-        <mc:Fallback>
+        <mc:Fallback xmlns="">
           <p:sp>
             <p:nvSpPr>
               <p:cNvPr id="3" name="Content Placeholder 2">
@@ -17327,8 +17730,8 @@
           <a:chExt cx="0" cy="0"/>
         </a:xfrm>
       </p:grpSpPr>
-      <mc:AlternateContent xmlns:mc="http://schemas.openxmlformats.org/markup-compatibility/2006">
-        <mc:Choice xmlns:a14="http://schemas.microsoft.com/office/drawing/2010/main" Requires="a14">
+      <mc:AlternateContent xmlns:mc="http://schemas.openxmlformats.org/markup-compatibility/2006" xmlns:a14="http://schemas.microsoft.com/office/drawing/2010/main">
+        <mc:Choice Requires="a14">
           <p:sp>
             <p:nvSpPr>
               <p:cNvPr id="3" name="Content Placeholder 2">
@@ -18293,7 +18696,7 @@
             </p:txBody>
           </p:sp>
         </mc:Choice>
-        <mc:Fallback>
+        <mc:Fallback xmlns="">
           <p:sp>
             <p:nvSpPr>
               <p:cNvPr id="3" name="Content Placeholder 2">
@@ -18950,8 +19353,8 @@
           </a:fontRef>
         </p:style>
       </p:cxnSp>
-      <mc:AlternateContent xmlns:mc="http://schemas.openxmlformats.org/markup-compatibility/2006">
-        <mc:Choice xmlns:a14="http://schemas.microsoft.com/office/drawing/2010/main" Requires="a14">
+      <mc:AlternateContent xmlns:mc="http://schemas.openxmlformats.org/markup-compatibility/2006" xmlns:a14="http://schemas.microsoft.com/office/drawing/2010/main">
+        <mc:Choice Requires="a14">
           <p:sp>
             <p:nvSpPr>
               <p:cNvPr id="8" name="TextBox 7">
@@ -19001,7 +19404,7 @@
             </p:txBody>
           </p:sp>
         </mc:Choice>
-        <mc:Fallback>
+        <mc:Fallback xmlns="">
           <p:sp>
             <p:nvSpPr>
               <p:cNvPr id="8" name="TextBox 7">
@@ -19046,8 +19449,8 @@
           </p:sp>
         </mc:Fallback>
       </mc:AlternateContent>
-      <mc:AlternateContent xmlns:mc="http://schemas.openxmlformats.org/markup-compatibility/2006">
-        <mc:Choice xmlns:a14="http://schemas.microsoft.com/office/drawing/2010/main" Requires="a14">
+      <mc:AlternateContent xmlns:mc="http://schemas.openxmlformats.org/markup-compatibility/2006" xmlns:a14="http://schemas.microsoft.com/office/drawing/2010/main">
+        <mc:Choice Requires="a14">
           <p:sp>
             <p:nvSpPr>
               <p:cNvPr id="9" name="TextBox 8">
@@ -19127,7 +19530,7 @@
             </p:txBody>
           </p:sp>
         </mc:Choice>
-        <mc:Fallback>
+        <mc:Fallback xmlns="">
           <p:sp>
             <p:nvSpPr>
               <p:cNvPr id="9" name="TextBox 8">
@@ -19325,8 +19728,8 @@
           </a:p>
         </p:txBody>
       </p:sp>
-      <mc:AlternateContent xmlns:mc="http://schemas.openxmlformats.org/markup-compatibility/2006">
-        <mc:Choice xmlns:a14="http://schemas.microsoft.com/office/drawing/2010/main" Requires="a14">
+      <mc:AlternateContent xmlns:mc="http://schemas.openxmlformats.org/markup-compatibility/2006" xmlns:a14="http://schemas.microsoft.com/office/drawing/2010/main">
+        <mc:Choice Requires="a14">
           <p:sp>
             <p:nvSpPr>
               <p:cNvPr id="12" name="TextBox 11">
@@ -19395,7 +19798,7 @@
             </p:txBody>
           </p:sp>
         </mc:Choice>
-        <mc:Fallback>
+        <mc:Fallback xmlns="">
           <p:sp>
             <p:nvSpPr>
               <p:cNvPr id="12" name="TextBox 11">
@@ -19526,8 +19929,8 @@
           </a:fontRef>
         </p:style>
       </p:cxnSp>
-      <mc:AlternateContent xmlns:mc="http://schemas.openxmlformats.org/markup-compatibility/2006">
-        <mc:Choice xmlns:a14="http://schemas.microsoft.com/office/drawing/2010/main" Requires="a14">
+      <mc:AlternateContent xmlns:mc="http://schemas.openxmlformats.org/markup-compatibility/2006" xmlns:a14="http://schemas.microsoft.com/office/drawing/2010/main">
+        <mc:Choice Requires="a14">
           <p:sp>
             <p:nvSpPr>
               <p:cNvPr id="18" name="TextBox 17">
@@ -19590,7 +19993,7 @@
             </p:txBody>
           </p:sp>
         </mc:Choice>
-        <mc:Fallback>
+        <mc:Fallback xmlns="">
           <p:sp>
             <p:nvSpPr>
               <p:cNvPr id="18" name="TextBox 17">

</xml_diff>